<commit_message>
my useless commit test
</commit_message>
<xml_diff>
--- a/Course-Project/CarCrashTodayPreview.pptx
+++ b/Course-Project/CarCrashTodayPreview.pptx
@@ -259,7 +259,7 @@
           <a:p>
             <a:fld id="{B8FAF278-E577-44DE-9BEA-E653AABB269D}" type="datetimeFigureOut">
               <a:rPr lang="ru-RU" smtClean="0"/>
-              <a:t>08.10.2018</a:t>
+              <a:t>09.10.2018</a:t>
             </a:fld>
             <a:endParaRPr lang="ru-RU"/>
           </a:p>
@@ -429,7 +429,7 @@
           <a:p>
             <a:fld id="{B8FAF278-E577-44DE-9BEA-E653AABB269D}" type="datetimeFigureOut">
               <a:rPr lang="ru-RU" smtClean="0"/>
-              <a:t>08.10.2018</a:t>
+              <a:t>09.10.2018</a:t>
             </a:fld>
             <a:endParaRPr lang="ru-RU"/>
           </a:p>
@@ -609,7 +609,7 @@
           <a:p>
             <a:fld id="{B8FAF278-E577-44DE-9BEA-E653AABB269D}" type="datetimeFigureOut">
               <a:rPr lang="ru-RU" smtClean="0"/>
-              <a:t>08.10.2018</a:t>
+              <a:t>09.10.2018</a:t>
             </a:fld>
             <a:endParaRPr lang="ru-RU"/>
           </a:p>
@@ -872,7 +872,7 @@
           <a:p>
             <a:fld id="{B8FAF278-E577-44DE-9BEA-E653AABB269D}" type="datetimeFigureOut">
               <a:rPr lang="ru-RU" smtClean="0"/>
-              <a:t>08.10.2018</a:t>
+              <a:t>09.10.2018</a:t>
             </a:fld>
             <a:endParaRPr lang="ru-RU"/>
           </a:p>
@@ -1042,7 +1042,7 @@
           <a:p>
             <a:fld id="{B8FAF278-E577-44DE-9BEA-E653AABB269D}" type="datetimeFigureOut">
               <a:rPr lang="ru-RU" smtClean="0"/>
-              <a:t>08.10.2018</a:t>
+              <a:t>09.10.2018</a:t>
             </a:fld>
             <a:endParaRPr lang="ru-RU"/>
           </a:p>
@@ -1288,7 +1288,7 @@
           <a:p>
             <a:fld id="{B8FAF278-E577-44DE-9BEA-E653AABB269D}" type="datetimeFigureOut">
               <a:rPr lang="ru-RU" smtClean="0"/>
-              <a:t>08.10.2018</a:t>
+              <a:t>09.10.2018</a:t>
             </a:fld>
             <a:endParaRPr lang="ru-RU"/>
           </a:p>
@@ -1580,7 +1580,7 @@
           <a:p>
             <a:fld id="{B8FAF278-E577-44DE-9BEA-E653AABB269D}" type="datetimeFigureOut">
               <a:rPr lang="ru-RU" smtClean="0"/>
-              <a:t>08.10.2018</a:t>
+              <a:t>09.10.2018</a:t>
             </a:fld>
             <a:endParaRPr lang="ru-RU"/>
           </a:p>
@@ -2010,7 +2010,7 @@
           <a:p>
             <a:fld id="{B8FAF278-E577-44DE-9BEA-E653AABB269D}" type="datetimeFigureOut">
               <a:rPr lang="ru-RU" smtClean="0"/>
-              <a:t>08.10.2018</a:t>
+              <a:t>09.10.2018</a:t>
             </a:fld>
             <a:endParaRPr lang="ru-RU"/>
           </a:p>
@@ -2133,7 +2133,7 @@
           <a:p>
             <a:fld id="{B8FAF278-E577-44DE-9BEA-E653AABB269D}" type="datetimeFigureOut">
               <a:rPr lang="ru-RU" smtClean="0"/>
-              <a:t>08.10.2018</a:t>
+              <a:t>09.10.2018</a:t>
             </a:fld>
             <a:endParaRPr lang="ru-RU"/>
           </a:p>
@@ -2228,7 +2228,7 @@
           <a:p>
             <a:fld id="{B8FAF278-E577-44DE-9BEA-E653AABB269D}" type="datetimeFigureOut">
               <a:rPr lang="ru-RU" smtClean="0"/>
-              <a:t>08.10.2018</a:t>
+              <a:t>09.10.2018</a:t>
             </a:fld>
             <a:endParaRPr lang="ru-RU"/>
           </a:p>
@@ -2511,7 +2511,7 @@
           <a:p>
             <a:fld id="{B8FAF278-E577-44DE-9BEA-E653AABB269D}" type="datetimeFigureOut">
               <a:rPr lang="ru-RU" smtClean="0"/>
-              <a:t>08.10.2018</a:t>
+              <a:t>09.10.2018</a:t>
             </a:fld>
             <a:endParaRPr lang="ru-RU"/>
           </a:p>
@@ -2681,7 +2681,7 @@
           <a:p>
             <a:fld id="{B8FAF278-E577-44DE-9BEA-E653AABB269D}" type="datetimeFigureOut">
               <a:rPr lang="ru-RU" smtClean="0"/>
-              <a:t>08.10.2018</a:t>
+              <a:t>09.10.2018</a:t>
             </a:fld>
             <a:endParaRPr lang="ru-RU"/>
           </a:p>
@@ -2972,7 +2972,7 @@
           <a:p>
             <a:fld id="{B8FAF278-E577-44DE-9BEA-E653AABB269D}" type="datetimeFigureOut">
               <a:rPr lang="ru-RU" smtClean="0"/>
-              <a:t>08.10.2018</a:t>
+              <a:t>09.10.2018</a:t>
             </a:fld>
             <a:endParaRPr lang="ru-RU"/>
           </a:p>
@@ -3273,7 +3273,7 @@
           <a:p>
             <a:fld id="{B8FAF278-E577-44DE-9BEA-E653AABB269D}" type="datetimeFigureOut">
               <a:rPr lang="ru-RU" smtClean="0"/>
-              <a:t>08.10.2018</a:t>
+              <a:t>09.10.2018</a:t>
             </a:fld>
             <a:endParaRPr lang="ru-RU"/>
           </a:p>
@@ -3521,7 +3521,7 @@
           <a:p>
             <a:fld id="{B8FAF278-E577-44DE-9BEA-E653AABB269D}" type="datetimeFigureOut">
               <a:rPr lang="ru-RU" smtClean="0"/>
-              <a:t>08.10.2018</a:t>
+              <a:t>09.10.2018</a:t>
             </a:fld>
             <a:endParaRPr lang="ru-RU"/>
           </a:p>
@@ -4057,7 +4057,7 @@
           <a:p>
             <a:fld id="{B8FAF278-E577-44DE-9BEA-E653AABB269D}" type="datetimeFigureOut">
               <a:rPr lang="ru-RU" smtClean="0"/>
-              <a:t>08.10.2018</a:t>
+              <a:t>09.10.2018</a:t>
             </a:fld>
             <a:endParaRPr lang="ru-RU"/>
           </a:p>
@@ -4305,7 +4305,7 @@
           <a:p>
             <a:fld id="{B8FAF278-E577-44DE-9BEA-E653AABB269D}" type="datetimeFigureOut">
               <a:rPr lang="ru-RU" smtClean="0"/>
-              <a:t>08.10.2018</a:t>
+              <a:t>09.10.2018</a:t>
             </a:fld>
             <a:endParaRPr lang="ru-RU"/>
           </a:p>
@@ -4848,7 +4848,7 @@
           <a:p>
             <a:fld id="{B8FAF278-E577-44DE-9BEA-E653AABB269D}" type="datetimeFigureOut">
               <a:rPr lang="ru-RU" smtClean="0"/>
-              <a:t>08.10.2018</a:t>
+              <a:t>09.10.2018</a:t>
             </a:fld>
             <a:endParaRPr lang="ru-RU"/>
           </a:p>
@@ -5158,7 +5158,7 @@
           <a:p>
             <a:fld id="{B8FAF278-E577-44DE-9BEA-E653AABB269D}" type="datetimeFigureOut">
               <a:rPr lang="ru-RU" smtClean="0"/>
-              <a:t>08.10.2018</a:t>
+              <a:t>09.10.2018</a:t>
             </a:fld>
             <a:endParaRPr lang="ru-RU"/>
           </a:p>
@@ -5333,7 +5333,7 @@
           <a:p>
             <a:fld id="{B8FAF278-E577-44DE-9BEA-E653AABB269D}" type="datetimeFigureOut">
               <a:rPr lang="ru-RU" smtClean="0"/>
-              <a:t>08.10.2018</a:t>
+              <a:t>09.10.2018</a:t>
             </a:fld>
             <a:endParaRPr lang="ru-RU"/>
           </a:p>
@@ -5513,7 +5513,7 @@
           <a:p>
             <a:fld id="{B8FAF278-E577-44DE-9BEA-E653AABB269D}" type="datetimeFigureOut">
               <a:rPr lang="ru-RU" smtClean="0"/>
-              <a:t>08.10.2018</a:t>
+              <a:t>09.10.2018</a:t>
             </a:fld>
             <a:endParaRPr lang="ru-RU"/>
           </a:p>
@@ -5764,7 +5764,7 @@
           <a:p>
             <a:fld id="{B8FAF278-E577-44DE-9BEA-E653AABB269D}" type="datetimeFigureOut">
               <a:rPr lang="ru-RU" smtClean="0"/>
-              <a:t>08.10.2018</a:t>
+              <a:t>09.10.2018</a:t>
             </a:fld>
             <a:endParaRPr lang="ru-RU"/>
           </a:p>
@@ -5996,7 +5996,7 @@
           <a:p>
             <a:fld id="{B8FAF278-E577-44DE-9BEA-E653AABB269D}" type="datetimeFigureOut">
               <a:rPr lang="ru-RU" smtClean="0"/>
-              <a:t>08.10.2018</a:t>
+              <a:t>09.10.2018</a:t>
             </a:fld>
             <a:endParaRPr lang="ru-RU"/>
           </a:p>
@@ -6343,7 +6343,7 @@
           <a:p>
             <a:fld id="{B8FAF278-E577-44DE-9BEA-E653AABB269D}" type="datetimeFigureOut">
               <a:rPr lang="ru-RU" smtClean="0"/>
-              <a:t>08.10.2018</a:t>
+              <a:t>09.10.2018</a:t>
             </a:fld>
             <a:endParaRPr lang="ru-RU"/>
           </a:p>
@@ -6461,7 +6461,7 @@
           <a:p>
             <a:fld id="{B8FAF278-E577-44DE-9BEA-E653AABB269D}" type="datetimeFigureOut">
               <a:rPr lang="ru-RU" smtClean="0"/>
-              <a:t>08.10.2018</a:t>
+              <a:t>09.10.2018</a:t>
             </a:fld>
             <a:endParaRPr lang="ru-RU"/>
           </a:p>
@@ -6579,7 +6579,7 @@
           <a:p>
             <a:fld id="{B8FAF278-E577-44DE-9BEA-E653AABB269D}" type="datetimeFigureOut">
               <a:rPr lang="ru-RU" smtClean="0"/>
-              <a:t>08.10.2018</a:t>
+              <a:t>09.10.2018</a:t>
             </a:fld>
             <a:endParaRPr lang="ru-RU"/>
           </a:p>
@@ -6863,7 +6863,7 @@
           <a:p>
             <a:fld id="{B8FAF278-E577-44DE-9BEA-E653AABB269D}" type="datetimeFigureOut">
               <a:rPr lang="ru-RU" smtClean="0"/>
-              <a:t>08.10.2018</a:t>
+              <a:t>09.10.2018</a:t>
             </a:fld>
             <a:endParaRPr lang="ru-RU"/>
           </a:p>
@@ -7127,7 +7127,7 @@
           <a:p>
             <a:fld id="{B8FAF278-E577-44DE-9BEA-E653AABB269D}" type="datetimeFigureOut">
               <a:rPr lang="ru-RU" smtClean="0"/>
-              <a:t>08.10.2018</a:t>
+              <a:t>09.10.2018</a:t>
             </a:fld>
             <a:endParaRPr lang="ru-RU"/>
           </a:p>
@@ -7341,7 +7341,7 @@
           <a:p>
             <a:fld id="{B8FAF278-E577-44DE-9BEA-E653AABB269D}" type="datetimeFigureOut">
               <a:rPr lang="ru-RU" smtClean="0"/>
-              <a:t>08.10.2018</a:t>
+              <a:t>09.10.2018</a:t>
             </a:fld>
             <a:endParaRPr lang="ru-RU"/>
           </a:p>
@@ -7878,7 +7878,7 @@
           <a:p>
             <a:fld id="{B8FAF278-E577-44DE-9BEA-E653AABB269D}" type="datetimeFigureOut">
               <a:rPr lang="ru-RU" smtClean="0"/>
-              <a:t>08.10.2018</a:t>
+              <a:t>09.10.2018</a:t>
             </a:fld>
             <a:endParaRPr lang="ru-RU"/>
           </a:p>
@@ -8604,37 +8604,42 @@
           <a:p>
             <a:pPr algn="r"/>
             <a:r>
+              <a:rPr lang="ru-RU"/>
+              <a:t>Никонова </a:t>
+            </a:r>
+            <a:r>
+              <a:rPr lang="ru-RU"/>
+              <a:t>М.А</a:t>
+            </a:r>
+            <a:r>
+              <a:rPr lang="ru-RU" smtClean="0"/>
+              <a:t>.</a:t>
+            </a:r>
+            <a:endParaRPr lang="en-US" smtClean="0"/>
+          </a:p>
+          <a:p>
+            <a:pPr algn="r"/>
+            <a:r>
               <a:rPr lang="ru-RU" dirty="0" smtClean="0"/>
-              <a:t>Кислова А.В</a:t>
+              <a:t>Кислова </a:t>
+            </a:r>
+            <a:r>
+              <a:rPr lang="ru-RU" dirty="0" smtClean="0"/>
+              <a:t>А.В.</a:t>
+            </a:r>
+            <a:endParaRPr lang="en-US" dirty="0" smtClean="0"/>
+          </a:p>
+          <a:p>
+            <a:pPr algn="r"/>
+            <a:r>
+              <a:rPr lang="ru-RU" dirty="0"/>
+              <a:t>Пьянов А.М</a:t>
             </a:r>
             <a:r>
               <a:rPr lang="ru-RU" dirty="0" smtClean="0"/>
               <a:t>.</a:t>
             </a:r>
-            <a:endParaRPr lang="en-US" dirty="0" smtClean="0"/>
-          </a:p>
-          <a:p>
-            <a:pPr algn="r"/>
-            <a:r>
-              <a:rPr lang="ru-RU" dirty="0"/>
-              <a:t>Пьянов А.М.</a:t>
-            </a:r>
-          </a:p>
-          <a:p>
-            <a:pPr algn="r"/>
-            <a:r>
-              <a:rPr lang="ru-RU" dirty="0" smtClean="0"/>
-              <a:t>Никонова </a:t>
-            </a:r>
-            <a:r>
-              <a:rPr lang="ru-RU" dirty="0" smtClean="0"/>
-              <a:t>М.А</a:t>
-            </a:r>
-            <a:r>
-              <a:rPr lang="ru-RU" dirty="0" smtClean="0"/>
-              <a:t>.</a:t>
-            </a:r>
-            <a:endParaRPr lang="ru-RU" dirty="0" smtClean="0"/>
+            <a:endParaRPr lang="ru-RU" dirty="0"/>
           </a:p>
         </p:txBody>
       </p:sp>

</xml_diff>